<commit_message>
Modified Presentations and md
</commit_message>
<xml_diff>
--- a/02. Projektsetup/Vorbereitung und Projektsetup.pptx
+++ b/02. Projektsetup/Vorbereitung und Projektsetup.pptx
@@ -294,7 +294,7 @@
               <a:pPr>
                 <a:defRPr/>
               </a:pPr>
-              <a:t>03.03.2017</a:t>
+              <a:t>07.09.2017</a:t>
             </a:fld>
             <a:endParaRPr lang="de-DE"/>
           </a:p>
@@ -493,7 +493,7 @@
               <a:pPr>
                 <a:defRPr/>
               </a:pPr>
-              <a:t>2017-03-03</a:t>
+              <a:t>2017-09-07</a:t>
             </a:fld>
             <a:endParaRPr lang="sv-SE"/>
           </a:p>
@@ -6361,12 +6361,8 @@
           <a:lstStyle/>
           <a:p>
             <a:r>
-              <a:rPr lang="de-DE" smtClean="0"/>
-              <a:t>02. Vorbereitung </a:t>
-            </a:r>
-            <a:r>
               <a:rPr lang="de-DE" dirty="0" smtClean="0"/>
-              <a:t>und Projektsetup</a:t>
+              <a:t>02. Vorbereitung und Projektsetup</a:t>
             </a:r>
             <a:endParaRPr lang="de-DE" dirty="0"/>
           </a:p>

</xml_diff>

<commit_message>
Added demo code, added README fixes
</commit_message>
<xml_diff>
--- a/02. Projektsetup/Vorbereitung und Projektsetup.pptx
+++ b/02. Projektsetup/Vorbereitung und Projektsetup.pptx
@@ -294,7 +294,7 @@
               <a:pPr>
                 <a:defRPr/>
               </a:pPr>
-              <a:t>07.09.2017</a:t>
+              <a:t>13.09.2017</a:t>
             </a:fld>
             <a:endParaRPr lang="de-DE"/>
           </a:p>
@@ -493,7 +493,7 @@
               <a:pPr>
                 <a:defRPr/>
               </a:pPr>
-              <a:t>2017-09-07</a:t>
+              <a:t>2017-09-13</a:t>
             </a:fld>
             <a:endParaRPr lang="sv-SE"/>
           </a:p>
@@ -5428,8 +5428,8 @@
           <a:lstStyle/>
           <a:p>
             <a:r>
-              <a:rPr lang="de-DE" dirty="0" smtClean="0"/>
-              <a:t>Daniel Beckmann</a:t>
+              <a:rPr lang="de-DE" dirty="0"/>
+              <a:t>Sadeq Abu Hantash</a:t>
             </a:r>
             <a:endParaRPr lang="de-DE" dirty="0"/>
           </a:p>

</xml_diff>